<commit_message>
Add Spring Boot Seminar
</commit_message>
<xml_diff>
--- a/비정기 세미나/Spring 프레임워크 세미나.pptx
+++ b/비정기 세미나/Spring 프레임워크 세미나.pptx
@@ -317,7 +317,7 @@
           <a:p>
             <a:fld id="{DD2B71F8-CBA1-4C43-8A77-AA508CE926FA}" type="datetimeFigureOut">
               <a:rPr lang="ko-KR" altLang="en-US" smtClean="0"/>
-              <a:t>2016-07-11</a:t>
+              <a:t>2021-02-17</a:t>
             </a:fld>
             <a:endParaRPr lang="ko-KR" altLang="en-US"/>
           </a:p>
@@ -487,7 +487,7 @@
           <a:p>
             <a:fld id="{DD2B71F8-CBA1-4C43-8A77-AA508CE926FA}" type="datetimeFigureOut">
               <a:rPr lang="ko-KR" altLang="en-US" smtClean="0"/>
-              <a:t>2016-07-11</a:t>
+              <a:t>2021-02-17</a:t>
             </a:fld>
             <a:endParaRPr lang="ko-KR" altLang="en-US"/>
           </a:p>
@@ -667,7 +667,7 @@
           <a:p>
             <a:fld id="{DD2B71F8-CBA1-4C43-8A77-AA508CE926FA}" type="datetimeFigureOut">
               <a:rPr lang="ko-KR" altLang="en-US" smtClean="0"/>
-              <a:t>2016-07-11</a:t>
+              <a:t>2021-02-17</a:t>
             </a:fld>
             <a:endParaRPr lang="ko-KR" altLang="en-US"/>
           </a:p>
@@ -837,7 +837,7 @@
           <a:p>
             <a:fld id="{DD2B71F8-CBA1-4C43-8A77-AA508CE926FA}" type="datetimeFigureOut">
               <a:rPr lang="ko-KR" altLang="en-US" smtClean="0"/>
-              <a:t>2016-07-11</a:t>
+              <a:t>2021-02-17</a:t>
             </a:fld>
             <a:endParaRPr lang="ko-KR" altLang="en-US"/>
           </a:p>
@@ -1083,7 +1083,7 @@
           <a:p>
             <a:fld id="{DD2B71F8-CBA1-4C43-8A77-AA508CE926FA}" type="datetimeFigureOut">
               <a:rPr lang="ko-KR" altLang="en-US" smtClean="0"/>
-              <a:t>2016-07-11</a:t>
+              <a:t>2021-02-17</a:t>
             </a:fld>
             <a:endParaRPr lang="ko-KR" altLang="en-US"/>
           </a:p>
@@ -1371,7 +1371,7 @@
           <a:p>
             <a:fld id="{DD2B71F8-CBA1-4C43-8A77-AA508CE926FA}" type="datetimeFigureOut">
               <a:rPr lang="ko-KR" altLang="en-US" smtClean="0"/>
-              <a:t>2016-07-11</a:t>
+              <a:t>2021-02-17</a:t>
             </a:fld>
             <a:endParaRPr lang="ko-KR" altLang="en-US"/>
           </a:p>
@@ -1793,7 +1793,7 @@
           <a:p>
             <a:fld id="{DD2B71F8-CBA1-4C43-8A77-AA508CE926FA}" type="datetimeFigureOut">
               <a:rPr lang="ko-KR" altLang="en-US" smtClean="0"/>
-              <a:t>2016-07-11</a:t>
+              <a:t>2021-02-17</a:t>
             </a:fld>
             <a:endParaRPr lang="ko-KR" altLang="en-US"/>
           </a:p>
@@ -1911,7 +1911,7 @@
           <a:p>
             <a:fld id="{DD2B71F8-CBA1-4C43-8A77-AA508CE926FA}" type="datetimeFigureOut">
               <a:rPr lang="ko-KR" altLang="en-US" smtClean="0"/>
-              <a:t>2016-07-11</a:t>
+              <a:t>2021-02-17</a:t>
             </a:fld>
             <a:endParaRPr lang="ko-KR" altLang="en-US"/>
           </a:p>
@@ -2006,7 +2006,7 @@
           <a:p>
             <a:fld id="{DD2B71F8-CBA1-4C43-8A77-AA508CE926FA}" type="datetimeFigureOut">
               <a:rPr lang="ko-KR" altLang="en-US" smtClean="0"/>
-              <a:t>2016-07-11</a:t>
+              <a:t>2021-02-17</a:t>
             </a:fld>
             <a:endParaRPr lang="ko-KR" altLang="en-US"/>
           </a:p>
@@ -2283,7 +2283,7 @@
           <a:p>
             <a:fld id="{DD2B71F8-CBA1-4C43-8A77-AA508CE926FA}" type="datetimeFigureOut">
               <a:rPr lang="ko-KR" altLang="en-US" smtClean="0"/>
-              <a:t>2016-07-11</a:t>
+              <a:t>2021-02-17</a:t>
             </a:fld>
             <a:endParaRPr lang="ko-KR" altLang="en-US"/>
           </a:p>
@@ -2536,7 +2536,7 @@
           <a:p>
             <a:fld id="{DD2B71F8-CBA1-4C43-8A77-AA508CE926FA}" type="datetimeFigureOut">
               <a:rPr lang="ko-KR" altLang="en-US" smtClean="0"/>
-              <a:t>2016-07-11</a:t>
+              <a:t>2021-02-17</a:t>
             </a:fld>
             <a:endParaRPr lang="ko-KR" altLang="en-US"/>
           </a:p>
@@ -2749,7 +2749,7 @@
           <a:p>
             <a:fld id="{DD2B71F8-CBA1-4C43-8A77-AA508CE926FA}" type="datetimeFigureOut">
               <a:rPr lang="ko-KR" altLang="en-US" smtClean="0"/>
-              <a:t>2016-07-11</a:t>
+              <a:t>2021-02-17</a:t>
             </a:fld>
             <a:endParaRPr lang="ko-KR" altLang="en-US"/>
           </a:p>
@@ -16544,11 +16544,7 @@
             </a:r>
             <a:r>
               <a:rPr lang="ko-KR" altLang="en-US" sz="2400" dirty="0" smtClean="0"/>
-              <a:t> </a:t>
-            </a:r>
-            <a:r>
-              <a:rPr lang="ko-KR" altLang="en-US" sz="2400" dirty="0" smtClean="0"/>
-              <a:t>설정 실행</a:t>
+              <a:t> 설정 실행</a:t>
             </a:r>
             <a:r>
               <a:rPr lang="en-US" altLang="ko-KR" sz="2400" dirty="0"/>
@@ -17042,11 +17038,7 @@
             </a:r>
             <a:r>
               <a:rPr lang="ko-KR" altLang="en-US" sz="2000" dirty="0" smtClean="0"/>
-              <a:t>빈 </a:t>
-            </a:r>
-            <a:r>
-              <a:rPr lang="ko-KR" altLang="en-US" sz="2000" dirty="0" smtClean="0"/>
-              <a:t>범위</a:t>
+              <a:t>빈 범위</a:t>
             </a:r>
             <a:endParaRPr lang="ko-KR" altLang="en-US" sz="2000" dirty="0"/>
           </a:p>
@@ -17122,11 +17114,7 @@
           <a:p>
             <a:r>
               <a:rPr lang="en-US" altLang="ko-KR" sz="1400" dirty="0" smtClean="0"/>
-              <a:t>- </a:t>
-            </a:r>
-            <a:r>
-              <a:rPr lang="en-US" altLang="ko-KR" sz="1400" dirty="0" smtClean="0"/>
-              <a:t>App.java(main class) </a:t>
+              <a:t>- App.java(main class) </a:t>
             </a:r>
             <a:r>
               <a:rPr lang="ko-KR" altLang="en-US" sz="1400" dirty="0" smtClean="0"/>
@@ -17667,11 +17655,7 @@
             </a:r>
             <a:r>
               <a:rPr lang="ko-KR" altLang="en-US" sz="2000" dirty="0" smtClean="0"/>
-              <a:t>빈 </a:t>
-            </a:r>
-            <a:r>
-              <a:rPr lang="ko-KR" altLang="en-US" sz="2000" dirty="0" smtClean="0"/>
-              <a:t>범위</a:t>
+              <a:t>빈 범위</a:t>
             </a:r>
             <a:endParaRPr lang="ko-KR" altLang="en-US" sz="2000" dirty="0"/>
           </a:p>
@@ -17747,11 +17731,7 @@
           <a:p>
             <a:r>
               <a:rPr lang="en-US" altLang="ko-KR" sz="1400" dirty="0" smtClean="0"/>
-              <a:t>- </a:t>
-            </a:r>
-            <a:r>
-              <a:rPr lang="en-US" altLang="ko-KR" sz="1400" dirty="0" smtClean="0"/>
-              <a:t>App.java(main class) </a:t>
+              <a:t>- App.java(main class) </a:t>
             </a:r>
             <a:r>
               <a:rPr lang="ko-KR" altLang="en-US" sz="1400" dirty="0" smtClean="0"/>
@@ -18280,19 +18260,11 @@
           <a:p>
             <a:r>
               <a:rPr lang="en-US" altLang="ko-KR" sz="2800" dirty="0" smtClean="0"/>
-              <a:t>5.1</a:t>
-            </a:r>
-            <a:r>
-              <a:rPr lang="en-US" altLang="ko-KR" sz="2800" dirty="0" smtClean="0"/>
-              <a:t> AOP </a:t>
+              <a:t>5.1 AOP </a:t>
             </a:r>
             <a:r>
               <a:rPr lang="ko-KR" altLang="en-US" sz="2800" dirty="0" smtClean="0"/>
-              <a:t>정의 </a:t>
-            </a:r>
-            <a:r>
-              <a:rPr lang="ko-KR" altLang="en-US" sz="2800" dirty="0" smtClean="0"/>
-              <a:t>및 개념</a:t>
+              <a:t>정의 및 개념</a:t>
             </a:r>
             <a:endParaRPr lang="ko-KR" altLang="en-US" sz="2800" dirty="0"/>
           </a:p>
@@ -19239,11 +19211,7 @@
           <a:p>
             <a:r>
               <a:rPr lang="en-US" altLang="ko-KR" sz="2400" dirty="0" smtClean="0"/>
-              <a:t>5.1</a:t>
-            </a:r>
-            <a:r>
-              <a:rPr lang="en-US" altLang="ko-KR" sz="2400" dirty="0" smtClean="0"/>
-              <a:t> AOP </a:t>
+              <a:t>5.1 AOP </a:t>
             </a:r>
             <a:r>
               <a:rPr lang="ko-KR" altLang="en-US" sz="2400" dirty="0" smtClean="0"/>
@@ -19685,7 +19653,6 @@
               <a:rPr lang="ko-KR" altLang="en-US" sz="2800" dirty="0"/>
               <a:t>구현</a:t>
             </a:r>
-            <a:endParaRPr lang="ko-KR" altLang="en-US" sz="2800" dirty="0"/>
           </a:p>
         </p:txBody>
       </p:sp>
@@ -20917,7 +20884,6 @@
               <a:rPr lang="ko-KR" altLang="en-US" sz="2000" dirty="0"/>
               <a:t>현</a:t>
             </a:r>
-            <a:endParaRPr lang="ko-KR" altLang="en-US" sz="2000" dirty="0"/>
           </a:p>
         </p:txBody>
       </p:sp>
@@ -21186,7 +21152,6 @@
               <a:rPr lang="ko-KR" altLang="en-US" sz="2000" dirty="0"/>
               <a:t>현</a:t>
             </a:r>
-            <a:endParaRPr lang="ko-KR" altLang="en-US" sz="2000" dirty="0"/>
           </a:p>
         </p:txBody>
       </p:sp>
@@ -21418,7 +21383,6 @@
               <a:rPr lang="ko-KR" altLang="en-US" sz="2000" dirty="0"/>
               <a:t>현</a:t>
             </a:r>
-            <a:endParaRPr lang="ko-KR" altLang="en-US" sz="2000" dirty="0"/>
           </a:p>
         </p:txBody>
       </p:sp>
@@ -21772,11 +21736,7 @@
             </a:pPr>
             <a:r>
               <a:rPr lang="en-US" altLang="ko-KR" sz="2400" baseline="0" dirty="0" smtClean="0"/>
-              <a:t>6</a:t>
-            </a:r>
-            <a:r>
-              <a:rPr lang="en-US" altLang="ko-KR" sz="2400" baseline="0" dirty="0" smtClean="0"/>
-              <a:t>)</a:t>
+              <a:t>6)</a:t>
             </a:r>
             <a:r>
               <a:rPr lang="en-US" altLang="ko-KR" sz="2400" dirty="0" smtClean="0"/>
@@ -23027,7 +22987,11 @@
             </a:r>
             <a:r>
               <a:rPr lang="ko-KR" altLang="en-US" sz="1400" dirty="0" smtClean="0"/>
-              <a:t>교체 시 호출클래스의 수정 해야 함</a:t>
+              <a:t>교체 시 </a:t>
+            </a:r>
+            <a:r>
+              <a:rPr lang="ko-KR" altLang="en-US" sz="1400" dirty="0" smtClean="0"/>
+              <a:t>호출클래스의 수정도 필요함</a:t>
             </a:r>
             <a:endParaRPr lang="ko-KR" altLang="en-US" sz="1400" dirty="0"/>
           </a:p>

</xml_diff>